<commit_message>
Updated ChIP-seq 5 slides
</commit_message>
<xml_diff>
--- a/Unit2-module2-ChIPseq/ChIP-seq.5.pptx
+++ b/Unit2-module2-ChIPseq/ChIP-seq.5.pptx
@@ -14731,12 +14731,9 @@
             </a:r>
           </a:p>
           <a:p>
-            <a:br>
-              <a:rPr lang="en-US" sz="2000" dirty="0"/>
-            </a:br>
-            <a:endParaRPr lang="en-US" sz="2000" dirty="0"/>
-          </a:p>
-          <a:p>
+            <a:pPr marL="0" indent="0">
+              <a:buNone/>
+            </a:pPr>
             <a:endParaRPr lang="en-US" sz="2000" dirty="0"/>
           </a:p>
           <a:p>
@@ -14818,7 +14815,12 @@
             <p:ph idx="1"/>
           </p:nvPr>
         </p:nvSpPr>
-        <p:spPr/>
+        <p:spPr>
+          <a:xfrm>
+            <a:off x="838200" y="1095023"/>
+            <a:ext cx="10515600" cy="2505428"/>
+          </a:xfrm>
+        </p:spPr>
         <p:txBody>
           <a:bodyPr/>
           <a:lstStyle/>
@@ -14886,8 +14888,6 @@
               </a:rPr>
               <a:t>-base</a:t>
             </a:r>
-          </a:p>
-          <a:p>
             <a:endParaRPr lang="pt" sz="2000" dirty="0">
               <a:solidFill>
                 <a:schemeClr val="bg1">
@@ -14986,8 +14986,6 @@
               </a:rPr>
               <a:t> </a:t>
             </a:r>
-          </a:p>
-          <a:p>
             <a:endParaRPr lang="en-US" sz="2000" dirty="0">
               <a:solidFill>
                 <a:schemeClr val="bg1">
@@ -15260,18 +15258,683 @@
               <a:t>=3.5.1</a:t>
             </a:r>
           </a:p>
-          <a:p>
-            <a:endParaRPr lang="en-US" sz="2000" dirty="0">
-              <a:solidFill>
-                <a:schemeClr val="accent1"/>
-              </a:solidFill>
-            </a:endParaRPr>
-          </a:p>
-          <a:p>
-            <a:endParaRPr lang="en-US" sz="2000" dirty="0"/>
-          </a:p>
-          <a:p>
+        </p:txBody>
+      </p:sp>
+      <p:sp>
+        <p:nvSpPr>
+          <p:cNvPr id="4" name="TextBox 3">
+            <a:extLst>
+              <a:ext uri="{FF2B5EF4-FFF2-40B4-BE49-F238E27FC236}">
+                <a16:creationId xmlns:a16="http://schemas.microsoft.com/office/drawing/2014/main" id="{D05EBC45-E00A-9641-A5A7-549EA9E479EE}"/>
+              </a:ext>
+            </a:extLst>
+          </p:cNvPr>
+          <p:cNvSpPr txBox="1"/>
+          <p:nvPr/>
+        </p:nvSpPr>
+        <p:spPr>
+          <a:xfrm>
+            <a:off x="4062211" y="4482697"/>
+            <a:ext cx="625556" cy="369332"/>
+          </a:xfrm>
+          <a:prstGeom prst="rect">
+            <a:avLst/>
+          </a:prstGeom>
+          <a:solidFill>
+            <a:schemeClr val="accent3"/>
+          </a:solidFill>
+        </p:spPr>
+        <p:txBody>
+          <a:bodyPr wrap="none" rtlCol="0">
+            <a:spAutoFit/>
+          </a:bodyPr>
+          <a:lstStyle/>
+          <a:p>
+            <a:r>
+              <a:rPr lang="en-US" dirty="0"/>
+              <a:t>Root</a:t>
+            </a:r>
+          </a:p>
+        </p:txBody>
+      </p:sp>
+      <p:sp>
+        <p:nvSpPr>
+          <p:cNvPr id="5" name="TextBox 4">
+            <a:extLst>
+              <a:ext uri="{FF2B5EF4-FFF2-40B4-BE49-F238E27FC236}">
+                <a16:creationId xmlns:a16="http://schemas.microsoft.com/office/drawing/2014/main" id="{77DDA048-3C12-5649-85FB-66EE371AF6BD}"/>
+              </a:ext>
+            </a:extLst>
+          </p:cNvPr>
+          <p:cNvSpPr txBox="1"/>
+          <p:nvPr/>
+        </p:nvSpPr>
+        <p:spPr>
+          <a:xfrm>
+            <a:off x="6474561" y="4482697"/>
+            <a:ext cx="784189" cy="369332"/>
+          </a:xfrm>
+          <a:prstGeom prst="rect">
+            <a:avLst/>
+          </a:prstGeom>
+          <a:solidFill>
+            <a:schemeClr val="accent5">
+              <a:lumMod val="20000"/>
+              <a:lumOff val="80000"/>
+            </a:schemeClr>
+          </a:solidFill>
+        </p:spPr>
+        <p:txBody>
+          <a:bodyPr wrap="none" rtlCol="0">
+            <a:spAutoFit/>
+          </a:bodyPr>
+          <a:lstStyle/>
+          <a:p>
+            <a:r>
+              <a:rPr lang="en-US" dirty="0" err="1"/>
+              <a:t>Conda</a:t>
+            </a:r>
             <a:endParaRPr lang="en-US" dirty="0"/>
+          </a:p>
+        </p:txBody>
+      </p:sp>
+      <p:sp>
+        <p:nvSpPr>
+          <p:cNvPr id="6" name="TextBox 5">
+            <a:extLst>
+              <a:ext uri="{FF2B5EF4-FFF2-40B4-BE49-F238E27FC236}">
+                <a16:creationId xmlns:a16="http://schemas.microsoft.com/office/drawing/2014/main" id="{8393E2FC-9F32-304F-AF4E-4421A025E55B}"/>
+              </a:ext>
+            </a:extLst>
+          </p:cNvPr>
+          <p:cNvSpPr txBox="1"/>
+          <p:nvPr/>
+        </p:nvSpPr>
+        <p:spPr>
+          <a:xfrm>
+            <a:off x="6163419" y="5157611"/>
+            <a:ext cx="622286" cy="369332"/>
+          </a:xfrm>
+          <a:prstGeom prst="rect">
+            <a:avLst/>
+          </a:prstGeom>
+          <a:solidFill>
+            <a:schemeClr val="accent5">
+              <a:lumMod val="20000"/>
+              <a:lumOff val="80000"/>
+            </a:schemeClr>
+          </a:solidFill>
+        </p:spPr>
+        <p:txBody>
+          <a:bodyPr wrap="none" rtlCol="0">
+            <a:spAutoFit/>
+          </a:bodyPr>
+          <a:lstStyle/>
+          <a:p>
+            <a:r>
+              <a:rPr lang="en-US" dirty="0"/>
+              <a:t>base</a:t>
+            </a:r>
+          </a:p>
+        </p:txBody>
+      </p:sp>
+      <p:sp>
+        <p:nvSpPr>
+          <p:cNvPr id="7" name="TextBox 6">
+            <a:extLst>
+              <a:ext uri="{FF2B5EF4-FFF2-40B4-BE49-F238E27FC236}">
+                <a16:creationId xmlns:a16="http://schemas.microsoft.com/office/drawing/2014/main" id="{AD8AA820-2F2E-BA45-A7D5-22C1F1158244}"/>
+              </a:ext>
+            </a:extLst>
+          </p:cNvPr>
+          <p:cNvSpPr txBox="1"/>
+          <p:nvPr/>
+        </p:nvSpPr>
+        <p:spPr>
+          <a:xfrm>
+            <a:off x="6969248" y="5157611"/>
+            <a:ext cx="579005" cy="369332"/>
+          </a:xfrm>
+          <a:prstGeom prst="rect">
+            <a:avLst/>
+          </a:prstGeom>
+          <a:solidFill>
+            <a:schemeClr val="accent5">
+              <a:lumMod val="20000"/>
+              <a:lumOff val="80000"/>
+            </a:schemeClr>
+          </a:solidFill>
+        </p:spPr>
+        <p:txBody>
+          <a:bodyPr wrap="none" rtlCol="0">
+            <a:spAutoFit/>
+          </a:bodyPr>
+          <a:lstStyle/>
+          <a:p>
+            <a:r>
+              <a:rPr lang="en-US" dirty="0"/>
+              <a:t>chip</a:t>
+            </a:r>
+          </a:p>
+        </p:txBody>
+      </p:sp>
+      <p:sp>
+        <p:nvSpPr>
+          <p:cNvPr id="8" name="TextBox 7">
+            <a:extLst>
+              <a:ext uri="{FF2B5EF4-FFF2-40B4-BE49-F238E27FC236}">
+                <a16:creationId xmlns:a16="http://schemas.microsoft.com/office/drawing/2014/main" id="{C2CD6A83-2DE0-3F44-8C21-4E81B18707D3}"/>
+              </a:ext>
+            </a:extLst>
+          </p:cNvPr>
+          <p:cNvSpPr txBox="1"/>
+          <p:nvPr/>
+        </p:nvSpPr>
+        <p:spPr>
+          <a:xfrm>
+            <a:off x="4898279" y="3825524"/>
+            <a:ext cx="1482201" cy="369332"/>
+          </a:xfrm>
+          <a:prstGeom prst="rect">
+            <a:avLst/>
+          </a:prstGeom>
+          <a:noFill/>
+          <a:ln w="28575">
+            <a:solidFill>
+              <a:schemeClr val="tx1"/>
+            </a:solidFill>
+          </a:ln>
+        </p:spPr>
+        <p:txBody>
+          <a:bodyPr wrap="none" rtlCol="0">
+            <a:spAutoFit/>
+          </a:bodyPr>
+          <a:lstStyle/>
+          <a:p>
+            <a:r>
+              <a:rPr lang="en-US" dirty="0"/>
+              <a:t>My Computer</a:t>
+            </a:r>
+          </a:p>
+        </p:txBody>
+      </p:sp>
+      <p:cxnSp>
+        <p:nvCxnSpPr>
+          <p:cNvPr id="10" name="Straight Connector 9">
+            <a:extLst>
+              <a:ext uri="{FF2B5EF4-FFF2-40B4-BE49-F238E27FC236}">
+                <a16:creationId xmlns:a16="http://schemas.microsoft.com/office/drawing/2014/main" id="{78F1EB39-0748-0146-9311-449E694D96DD}"/>
+              </a:ext>
+            </a:extLst>
+          </p:cNvPr>
+          <p:cNvCxnSpPr>
+            <a:stCxn id="8" idx="2"/>
+            <a:endCxn id="4" idx="0"/>
+          </p:cNvCxnSpPr>
+          <p:nvPr/>
+        </p:nvCxnSpPr>
+        <p:spPr>
+          <a:xfrm flipH="1">
+            <a:off x="4374989" y="4194856"/>
+            <a:ext cx="1264391" cy="287841"/>
+          </a:xfrm>
+          <a:prstGeom prst="line">
+            <a:avLst/>
+          </a:prstGeom>
+          <a:ln/>
+        </p:spPr>
+        <p:style>
+          <a:lnRef idx="1">
+            <a:schemeClr val="dk1"/>
+          </a:lnRef>
+          <a:fillRef idx="0">
+            <a:schemeClr val="dk1"/>
+          </a:fillRef>
+          <a:effectRef idx="0">
+            <a:schemeClr val="dk1"/>
+          </a:effectRef>
+          <a:fontRef idx="minor">
+            <a:schemeClr val="tx1"/>
+          </a:fontRef>
+        </p:style>
+      </p:cxnSp>
+      <p:cxnSp>
+        <p:nvCxnSpPr>
+          <p:cNvPr id="12" name="Straight Connector 11">
+            <a:extLst>
+              <a:ext uri="{FF2B5EF4-FFF2-40B4-BE49-F238E27FC236}">
+                <a16:creationId xmlns:a16="http://schemas.microsoft.com/office/drawing/2014/main" id="{24CB06E5-B2AC-E141-96C1-6535B12CF314}"/>
+              </a:ext>
+            </a:extLst>
+          </p:cNvPr>
+          <p:cNvCxnSpPr>
+            <a:stCxn id="8" idx="2"/>
+            <a:endCxn id="5" idx="0"/>
+          </p:cNvCxnSpPr>
+          <p:nvPr/>
+        </p:nvCxnSpPr>
+        <p:spPr>
+          <a:xfrm>
+            <a:off x="5639380" y="4194856"/>
+            <a:ext cx="1227276" cy="287841"/>
+          </a:xfrm>
+          <a:prstGeom prst="line">
+            <a:avLst/>
+          </a:prstGeom>
+          <a:ln>
+            <a:solidFill>
+              <a:schemeClr val="tx1"/>
+            </a:solidFill>
+          </a:ln>
+        </p:spPr>
+        <p:style>
+          <a:lnRef idx="1">
+            <a:schemeClr val="accent1"/>
+          </a:lnRef>
+          <a:fillRef idx="0">
+            <a:schemeClr val="accent1"/>
+          </a:fillRef>
+          <a:effectRef idx="0">
+            <a:schemeClr val="accent1"/>
+          </a:effectRef>
+          <a:fontRef idx="minor">
+            <a:schemeClr val="tx1"/>
+          </a:fontRef>
+        </p:style>
+      </p:cxnSp>
+      <p:cxnSp>
+        <p:nvCxnSpPr>
+          <p:cNvPr id="14" name="Straight Connector 13">
+            <a:extLst>
+              <a:ext uri="{FF2B5EF4-FFF2-40B4-BE49-F238E27FC236}">
+                <a16:creationId xmlns:a16="http://schemas.microsoft.com/office/drawing/2014/main" id="{F7F60530-2952-134B-AB82-259ACAEC2A8A}"/>
+              </a:ext>
+            </a:extLst>
+          </p:cNvPr>
+          <p:cNvCxnSpPr>
+            <a:stCxn id="5" idx="2"/>
+            <a:endCxn id="6" idx="0"/>
+          </p:cNvCxnSpPr>
+          <p:nvPr/>
+        </p:nvCxnSpPr>
+        <p:spPr>
+          <a:xfrm flipH="1">
+            <a:off x="6474562" y="4852029"/>
+            <a:ext cx="392094" cy="305582"/>
+          </a:xfrm>
+          <a:prstGeom prst="line">
+            <a:avLst/>
+          </a:prstGeom>
+        </p:spPr>
+        <p:style>
+          <a:lnRef idx="1">
+            <a:schemeClr val="accent1"/>
+          </a:lnRef>
+          <a:fillRef idx="0">
+            <a:schemeClr val="accent1"/>
+          </a:fillRef>
+          <a:effectRef idx="0">
+            <a:schemeClr val="accent1"/>
+          </a:effectRef>
+          <a:fontRef idx="minor">
+            <a:schemeClr val="tx1"/>
+          </a:fontRef>
+        </p:style>
+      </p:cxnSp>
+      <p:cxnSp>
+        <p:nvCxnSpPr>
+          <p:cNvPr id="16" name="Straight Connector 15">
+            <a:extLst>
+              <a:ext uri="{FF2B5EF4-FFF2-40B4-BE49-F238E27FC236}">
+                <a16:creationId xmlns:a16="http://schemas.microsoft.com/office/drawing/2014/main" id="{ED766200-6737-2745-AADF-38E48FB9AB77}"/>
+              </a:ext>
+            </a:extLst>
+          </p:cNvPr>
+          <p:cNvCxnSpPr>
+            <a:stCxn id="5" idx="2"/>
+            <a:endCxn id="7" idx="0"/>
+          </p:cNvCxnSpPr>
+          <p:nvPr/>
+        </p:nvCxnSpPr>
+        <p:spPr>
+          <a:xfrm>
+            <a:off x="6866656" y="4852029"/>
+            <a:ext cx="392095" cy="305582"/>
+          </a:xfrm>
+          <a:prstGeom prst="line">
+            <a:avLst/>
+          </a:prstGeom>
+        </p:spPr>
+        <p:style>
+          <a:lnRef idx="1">
+            <a:schemeClr val="accent1"/>
+          </a:lnRef>
+          <a:fillRef idx="0">
+            <a:schemeClr val="accent1"/>
+          </a:fillRef>
+          <a:effectRef idx="0">
+            <a:schemeClr val="accent1"/>
+          </a:effectRef>
+          <a:fontRef idx="minor">
+            <a:schemeClr val="tx1"/>
+          </a:fontRef>
+        </p:style>
+      </p:cxnSp>
+      <p:cxnSp>
+        <p:nvCxnSpPr>
+          <p:cNvPr id="18" name="Straight Connector 17">
+            <a:extLst>
+              <a:ext uri="{FF2B5EF4-FFF2-40B4-BE49-F238E27FC236}">
+                <a16:creationId xmlns:a16="http://schemas.microsoft.com/office/drawing/2014/main" id="{F69528BB-F3CF-5846-9583-8892B95DED5A}"/>
+              </a:ext>
+            </a:extLst>
+          </p:cNvPr>
+          <p:cNvCxnSpPr>
+            <a:stCxn id="4" idx="2"/>
+          </p:cNvCxnSpPr>
+          <p:nvPr/>
+        </p:nvCxnSpPr>
+        <p:spPr>
+          <a:xfrm>
+            <a:off x="4374989" y="4852029"/>
+            <a:ext cx="0" cy="305582"/>
+          </a:xfrm>
+          <a:prstGeom prst="line">
+            <a:avLst/>
+          </a:prstGeom>
+          <a:ln>
+            <a:solidFill>
+              <a:schemeClr val="tx1"/>
+            </a:solidFill>
+          </a:ln>
+        </p:spPr>
+        <p:style>
+          <a:lnRef idx="1">
+            <a:schemeClr val="accent1"/>
+          </a:lnRef>
+          <a:fillRef idx="0">
+            <a:schemeClr val="accent1"/>
+          </a:fillRef>
+          <a:effectRef idx="0">
+            <a:schemeClr val="accent1"/>
+          </a:effectRef>
+          <a:fontRef idx="minor">
+            <a:schemeClr val="tx1"/>
+          </a:fontRef>
+        </p:style>
+      </p:cxnSp>
+      <p:sp>
+        <p:nvSpPr>
+          <p:cNvPr id="19" name="TextBox 18">
+            <a:extLst>
+              <a:ext uri="{FF2B5EF4-FFF2-40B4-BE49-F238E27FC236}">
+                <a16:creationId xmlns:a16="http://schemas.microsoft.com/office/drawing/2014/main" id="{58B20C6C-EB0E-5940-AF98-23904D405146}"/>
+              </a:ext>
+            </a:extLst>
+          </p:cNvPr>
+          <p:cNvSpPr txBox="1"/>
+          <p:nvPr/>
+        </p:nvSpPr>
+        <p:spPr>
+          <a:xfrm>
+            <a:off x="4196094" y="5157611"/>
+            <a:ext cx="357791" cy="461665"/>
+          </a:xfrm>
+          <a:prstGeom prst="rect">
+            <a:avLst/>
+          </a:prstGeom>
+          <a:solidFill>
+            <a:schemeClr val="accent4">
+              <a:lumMod val="20000"/>
+              <a:lumOff val="80000"/>
+            </a:schemeClr>
+          </a:solidFill>
+        </p:spPr>
+        <p:txBody>
+          <a:bodyPr wrap="none" rtlCol="0">
+            <a:spAutoFit/>
+          </a:bodyPr>
+          <a:lstStyle/>
+          <a:p>
+            <a:pPr algn="ctr"/>
+            <a:r>
+              <a:rPr lang="en-US" sz="2400" b="1" dirty="0"/>
+              <a:t>R</a:t>
+            </a:r>
+          </a:p>
+        </p:txBody>
+      </p:sp>
+      <p:cxnSp>
+        <p:nvCxnSpPr>
+          <p:cNvPr id="21" name="Straight Connector 20">
+            <a:extLst>
+              <a:ext uri="{FF2B5EF4-FFF2-40B4-BE49-F238E27FC236}">
+                <a16:creationId xmlns:a16="http://schemas.microsoft.com/office/drawing/2014/main" id="{B803165E-FCB4-3745-96B8-00DC9FA3A678}"/>
+              </a:ext>
+            </a:extLst>
+          </p:cNvPr>
+          <p:cNvCxnSpPr>
+            <a:stCxn id="6" idx="2"/>
+          </p:cNvCxnSpPr>
+          <p:nvPr/>
+        </p:nvCxnSpPr>
+        <p:spPr>
+          <a:xfrm flipH="1">
+            <a:off x="6474561" y="5526943"/>
+            <a:ext cx="1" cy="302862"/>
+          </a:xfrm>
+          <a:prstGeom prst="line">
+            <a:avLst/>
+          </a:prstGeom>
+        </p:spPr>
+        <p:style>
+          <a:lnRef idx="1">
+            <a:schemeClr val="accent1"/>
+          </a:lnRef>
+          <a:fillRef idx="0">
+            <a:schemeClr val="accent1"/>
+          </a:fillRef>
+          <a:effectRef idx="0">
+            <a:schemeClr val="accent1"/>
+          </a:effectRef>
+          <a:fontRef idx="minor">
+            <a:schemeClr val="tx1"/>
+          </a:fontRef>
+        </p:style>
+      </p:cxnSp>
+      <p:cxnSp>
+        <p:nvCxnSpPr>
+          <p:cNvPr id="22" name="Straight Connector 21">
+            <a:extLst>
+              <a:ext uri="{FF2B5EF4-FFF2-40B4-BE49-F238E27FC236}">
+                <a16:creationId xmlns:a16="http://schemas.microsoft.com/office/drawing/2014/main" id="{D1E5D700-CE9F-D949-89E2-AD340720D7FA}"/>
+              </a:ext>
+            </a:extLst>
+          </p:cNvPr>
+          <p:cNvCxnSpPr/>
+          <p:nvPr/>
+        </p:nvCxnSpPr>
+        <p:spPr>
+          <a:xfrm flipH="1">
+            <a:off x="7258750" y="5526943"/>
+            <a:ext cx="1" cy="302862"/>
+          </a:xfrm>
+          <a:prstGeom prst="line">
+            <a:avLst/>
+          </a:prstGeom>
+        </p:spPr>
+        <p:style>
+          <a:lnRef idx="1">
+            <a:schemeClr val="accent1"/>
+          </a:lnRef>
+          <a:fillRef idx="0">
+            <a:schemeClr val="accent1"/>
+          </a:fillRef>
+          <a:effectRef idx="0">
+            <a:schemeClr val="accent1"/>
+          </a:effectRef>
+          <a:fontRef idx="minor">
+            <a:schemeClr val="tx1"/>
+          </a:fontRef>
+        </p:style>
+      </p:cxnSp>
+      <p:sp>
+        <p:nvSpPr>
+          <p:cNvPr id="23" name="TextBox 22">
+            <a:extLst>
+              <a:ext uri="{FF2B5EF4-FFF2-40B4-BE49-F238E27FC236}">
+                <a16:creationId xmlns:a16="http://schemas.microsoft.com/office/drawing/2014/main" id="{D42B1F17-72B5-B54B-BE07-E5EABDA92333}"/>
+              </a:ext>
+            </a:extLst>
+          </p:cNvPr>
+          <p:cNvSpPr txBox="1"/>
+          <p:nvPr/>
+        </p:nvSpPr>
+        <p:spPr>
+          <a:xfrm>
+            <a:off x="6295666" y="5829805"/>
+            <a:ext cx="357791" cy="461665"/>
+          </a:xfrm>
+          <a:prstGeom prst="rect">
+            <a:avLst/>
+          </a:prstGeom>
+          <a:solidFill>
+            <a:schemeClr val="accent4">
+              <a:lumMod val="20000"/>
+              <a:lumOff val="80000"/>
+            </a:schemeClr>
+          </a:solidFill>
+        </p:spPr>
+        <p:txBody>
+          <a:bodyPr wrap="none" rtlCol="0">
+            <a:spAutoFit/>
+          </a:bodyPr>
+          <a:lstStyle/>
+          <a:p>
+            <a:pPr algn="ctr"/>
+            <a:r>
+              <a:rPr lang="en-US" sz="2400" b="1" dirty="0"/>
+              <a:t>R</a:t>
+            </a:r>
+          </a:p>
+        </p:txBody>
+      </p:sp>
+      <p:sp>
+        <p:nvSpPr>
+          <p:cNvPr id="24" name="TextBox 23">
+            <a:extLst>
+              <a:ext uri="{FF2B5EF4-FFF2-40B4-BE49-F238E27FC236}">
+                <a16:creationId xmlns:a16="http://schemas.microsoft.com/office/drawing/2014/main" id="{57C9CE3B-CD46-724E-B8EC-D1F1C8272C73}"/>
+              </a:ext>
+            </a:extLst>
+          </p:cNvPr>
+          <p:cNvSpPr txBox="1"/>
+          <p:nvPr/>
+        </p:nvSpPr>
+        <p:spPr>
+          <a:xfrm>
+            <a:off x="7079855" y="5839612"/>
+            <a:ext cx="357791" cy="461665"/>
+          </a:xfrm>
+          <a:prstGeom prst="rect">
+            <a:avLst/>
+          </a:prstGeom>
+          <a:solidFill>
+            <a:schemeClr val="accent4">
+              <a:lumMod val="20000"/>
+              <a:lumOff val="80000"/>
+            </a:schemeClr>
+          </a:solidFill>
+        </p:spPr>
+        <p:txBody>
+          <a:bodyPr wrap="none" rtlCol="0">
+            <a:spAutoFit/>
+          </a:bodyPr>
+          <a:lstStyle/>
+          <a:p>
+            <a:pPr algn="ctr"/>
+            <a:r>
+              <a:rPr lang="en-US" sz="2400" b="1" dirty="0"/>
+              <a:t>R</a:t>
+            </a:r>
+          </a:p>
+        </p:txBody>
+      </p:sp>
+      <p:sp>
+        <p:nvSpPr>
+          <p:cNvPr id="26" name="TextBox 25">
+            <a:extLst>
+              <a:ext uri="{FF2B5EF4-FFF2-40B4-BE49-F238E27FC236}">
+                <a16:creationId xmlns:a16="http://schemas.microsoft.com/office/drawing/2014/main" id="{EA3C945D-468A-4F44-B2E2-92ADE303992F}"/>
+              </a:ext>
+            </a:extLst>
+          </p:cNvPr>
+          <p:cNvSpPr txBox="1"/>
+          <p:nvPr/>
+        </p:nvSpPr>
+        <p:spPr>
+          <a:xfrm>
+            <a:off x="6319989" y="5701113"/>
+            <a:ext cx="450764" cy="707886"/>
+          </a:xfrm>
+          <a:prstGeom prst="rect">
+            <a:avLst/>
+          </a:prstGeom>
+          <a:noFill/>
+        </p:spPr>
+        <p:txBody>
+          <a:bodyPr wrap="none" rtlCol="0">
+            <a:spAutoFit/>
+          </a:bodyPr>
+          <a:lstStyle/>
+          <a:p>
+            <a:r>
+              <a:rPr lang="en-US" sz="4000" dirty="0">
+                <a:solidFill>
+                  <a:srgbClr val="FF0000"/>
+                </a:solidFill>
+              </a:rPr>
+              <a:t>X</a:t>
+            </a:r>
+          </a:p>
+        </p:txBody>
+      </p:sp>
+      <p:sp>
+        <p:nvSpPr>
+          <p:cNvPr id="27" name="TextBox 26">
+            <a:extLst>
+              <a:ext uri="{FF2B5EF4-FFF2-40B4-BE49-F238E27FC236}">
+                <a16:creationId xmlns:a16="http://schemas.microsoft.com/office/drawing/2014/main" id="{8F4D0F78-61B0-0740-B729-A98D851572EB}"/>
+              </a:ext>
+            </a:extLst>
+          </p:cNvPr>
+          <p:cNvSpPr txBox="1"/>
+          <p:nvPr/>
+        </p:nvSpPr>
+        <p:spPr>
+          <a:xfrm>
+            <a:off x="7096777" y="5701113"/>
+            <a:ext cx="450764" cy="707886"/>
+          </a:xfrm>
+          <a:prstGeom prst="rect">
+            <a:avLst/>
+          </a:prstGeom>
+          <a:noFill/>
+        </p:spPr>
+        <p:txBody>
+          <a:bodyPr wrap="none" rtlCol="0">
+            <a:spAutoFit/>
+          </a:bodyPr>
+          <a:lstStyle/>
+          <a:p>
+            <a:r>
+              <a:rPr lang="en-US" sz="4000" dirty="0">
+                <a:solidFill>
+                  <a:srgbClr val="FF0000"/>
+                </a:solidFill>
+              </a:rPr>
+              <a:t>X</a:t>
+            </a:r>
           </a:p>
         </p:txBody>
       </p:sp>

</xml_diff>